<commit_message>
module 04 ready for release
</commit_message>
<xml_diff>
--- a/Slides/Lesson 4.4 More Recursive Data Types.pptx
+++ b/Slides/Lesson 4.4 More Recursive Data Types.pptx
@@ -233,7 +233,7 @@
             <a:fld id="{CF8F25F6-E1EF-4065-8525-42EDEBD9BD22}" type="datetimeFigureOut">
               <a:rPr lang="en-US" smtClean="0"/>
               <a:pPr/>
-              <a:t>8/22/2016</a:t>
+              <a:t>9/25/2016</a:t>
             </a:fld>
             <a:endParaRPr lang="en-US"/>
           </a:p>
@@ -941,7 +941,7 @@
           <a:p>
             <a:fld id="{2F1F79F5-7BEC-496A-AFC7-876E38F64D71}" type="datetime1">
               <a:rPr lang="en-US" smtClean="0"/>
-              <a:t>8/22/2016</a:t>
+              <a:t>9/25/2016</a:t>
             </a:fld>
             <a:endParaRPr lang="en-US"/>
           </a:p>
@@ -1036,7 +1036,7 @@
           <a:p>
             <a:fld id="{0A05703A-7669-4FEA-9056-25299B4D29D4}" type="datetime1">
               <a:rPr lang="en-US" smtClean="0"/>
-              <a:t>8/22/2016</a:t>
+              <a:t>9/25/2016</a:t>
             </a:fld>
             <a:endParaRPr lang="en-US"/>
           </a:p>
@@ -1311,7 +1311,7 @@
           <a:p>
             <a:fld id="{6E5077B5-BB57-49DB-88CA-226A139E5C01}" type="datetime1">
               <a:rPr lang="en-US" smtClean="0"/>
-              <a:t>8/22/2016</a:t>
+              <a:t>9/25/2016</a:t>
             </a:fld>
             <a:endParaRPr lang="en-US"/>
           </a:p>
@@ -1563,7 +1563,7 @@
           <a:p>
             <a:fld id="{C48D9447-CBD6-49A1-89FD-8512A8CF8999}" type="datetime1">
               <a:rPr lang="en-US" smtClean="0"/>
-              <a:t>8/22/2016</a:t>
+              <a:t>9/25/2016</a:t>
             </a:fld>
             <a:endParaRPr lang="en-US"/>
           </a:p>
@@ -1731,7 +1731,7 @@
           <a:p>
             <a:fld id="{A3639A2A-823D-48B7-9ACE-7FAF42870BA9}" type="datetime1">
               <a:rPr lang="en-US" smtClean="0"/>
-              <a:t>8/22/2016</a:t>
+              <a:t>9/25/2016</a:t>
             </a:fld>
             <a:endParaRPr lang="en-US"/>
           </a:p>
@@ -1909,7 +1909,7 @@
           <a:p>
             <a:fld id="{ED1B6996-82E9-463C-972C-7B56056E426C}" type="datetime1">
               <a:rPr lang="en-US" smtClean="0"/>
-              <a:t>8/22/2016</a:t>
+              <a:t>9/25/2016</a:t>
             </a:fld>
             <a:endParaRPr lang="en-US"/>
           </a:p>
@@ -2083,7 +2083,7 @@
           <a:p>
             <a:fld id="{E22ED4DA-448D-4BB1-B935-CC112220207B}" type="datetime1">
               <a:rPr lang="en-US" smtClean="0"/>
-              <a:t>8/22/2016</a:t>
+              <a:t>9/25/2016</a:t>
             </a:fld>
             <a:endParaRPr lang="en-US"/>
           </a:p>
@@ -2256,7 +2256,7 @@
           <a:p>
             <a:fld id="{E22ED4DA-448D-4BB1-B935-CC112220207B}" type="datetime1">
               <a:rPr lang="en-US" smtClean="0"/>
-              <a:t>8/22/2016</a:t>
+              <a:t>9/25/2016</a:t>
             </a:fld>
             <a:endParaRPr lang="en-US"/>
           </a:p>
@@ -2516,7 +2516,7 @@
           <a:p>
             <a:fld id="{FF5D65A6-AB94-4435-B0B7-3743215FA46C}" type="datetime1">
               <a:rPr lang="en-US" smtClean="0"/>
-              <a:t>8/22/2016</a:t>
+              <a:t>9/25/2016</a:t>
             </a:fld>
             <a:endParaRPr lang="en-US"/>
           </a:p>
@@ -2692,7 +2692,7 @@
           <a:p>
             <a:fld id="{FF5D65A6-AB94-4435-B0B7-3743215FA46C}" type="datetime1">
               <a:rPr lang="en-US" smtClean="0"/>
-              <a:t>8/22/2016</a:t>
+              <a:t>9/25/2016</a:t>
             </a:fld>
             <a:endParaRPr lang="en-US"/>
           </a:p>
@@ -2986,7 +2986,7 @@
           <a:p>
             <a:fld id="{7C193DC4-6EF0-48C9-B29C-616106A645E1}" type="datetime1">
               <a:rPr lang="en-US" smtClean="0"/>
-              <a:t>8/22/2016</a:t>
+              <a:t>9/25/2016</a:t>
             </a:fld>
             <a:endParaRPr lang="en-US"/>
           </a:p>
@@ -3271,7 +3271,7 @@
           <a:p>
             <a:fld id="{5D1846AD-9252-4647-9435-4C2AC365653A}" type="datetime1">
               <a:rPr lang="en-US" smtClean="0"/>
-              <a:t>8/22/2016</a:t>
+              <a:t>9/25/2016</a:t>
             </a:fld>
             <a:endParaRPr lang="en-US"/>
           </a:p>
@@ -3690,7 +3690,7 @@
           <a:p>
             <a:fld id="{CE56DC10-3561-4063-A6AF-C1CC7A41040A}" type="datetime1">
               <a:rPr lang="en-US" smtClean="0"/>
-              <a:t>8/22/2016</a:t>
+              <a:t>9/25/2016</a:t>
             </a:fld>
             <a:endParaRPr lang="en-US"/>
           </a:p>
@@ -3807,7 +3807,7 @@
           <a:p>
             <a:fld id="{2F7B77F5-1464-4F6B-92A8-64FC8A508293}" type="datetime1">
               <a:rPr lang="en-US" smtClean="0"/>
-              <a:t>8/22/2016</a:t>
+              <a:t>9/25/2016</a:t>
             </a:fld>
             <a:endParaRPr lang="en-US"/>
           </a:p>
@@ -4030,7 +4030,7 @@
           <a:p>
             <a:fld id="{02B3F677-983B-48DB-ADFD-63FE6CBC7FB2}" type="datetime1">
               <a:rPr lang="en-US" smtClean="0"/>
-              <a:t>8/22/2016</a:t>
+              <a:t>9/25/2016</a:t>
             </a:fld>
             <a:endParaRPr lang="en-US"/>
           </a:p>
@@ -5248,8 +5248,8 @@
           <a:chExt cx="0" cy="0"/>
         </a:xfrm>
       </p:grpSpPr>
-      <mc:AlternateContent xmlns:mc="http://schemas.openxmlformats.org/markup-compatibility/2006">
-        <mc:Choice xmlns:a14="http://schemas.microsoft.com/office/drawing/2010/main" Requires="a14">
+      <mc:AlternateContent xmlns:mc="http://schemas.openxmlformats.org/markup-compatibility/2006" xmlns:a14="http://schemas.microsoft.com/office/drawing/2010/main">
+        <mc:Choice Requires="a14">
           <p:sp>
             <p:nvSpPr>
               <p:cNvPr id="3" name="Content Placeholder 2"/>
@@ -5313,7 +5313,7 @@
             </p:txBody>
           </p:sp>
         </mc:Choice>
-        <mc:Fallback>
+        <mc:Fallback xmlns="">
           <p:sp>
             <p:nvSpPr>
               <p:cNvPr id="3" name="Content Placeholder 2"/>
@@ -5445,8 +5445,8 @@
           </a:p>
         </p:txBody>
       </p:sp>
-      <mc:AlternateContent xmlns:mc="http://schemas.openxmlformats.org/markup-compatibility/2006">
-        <mc:Choice xmlns:a14="http://schemas.microsoft.com/office/drawing/2010/main" Requires="a14">
+      <mc:AlternateContent xmlns:mc="http://schemas.openxmlformats.org/markup-compatibility/2006" xmlns:a14="http://schemas.microsoft.com/office/drawing/2010/main">
+        <mc:Choice Requires="a14">
           <p:sp>
             <p:nvSpPr>
               <p:cNvPr id="6" name="TextBox 5"/>
@@ -5487,7 +5487,7 @@
             </p:txBody>
           </p:sp>
         </mc:Choice>
-        <mc:Fallback>
+        <mc:Fallback xmlns="">
           <p:sp>
             <p:nvSpPr>
               <p:cNvPr id="6" name="TextBox 5"/>
@@ -6983,8 +6983,13 @@
           <a:p>
             <a:r>
               <a:rPr lang="en-US" dirty="0"/>
-              <a:t>Do Guided Practice 4.4++</a:t>
-            </a:r>
+              <a:t>Do Guided </a:t>
+            </a:r>
+            <a:r>
+              <a:rPr lang="en-US"/>
+              <a:t>Practice 4.4</a:t>
+            </a:r>
+            <a:endParaRPr lang="en-US" dirty="0"/>
           </a:p>
           <a:p>
             <a:r>
@@ -7015,87 +7020,6 @@
               <a:t>22</a:t>
             </a:fld>
             <a:endParaRPr lang="en-US"/>
-          </a:p>
-        </p:txBody>
-      </p:sp>
-      <p:sp>
-        <p:nvSpPr>
-          <p:cNvPr id="5" name="Rectangle 4"/>
-          <p:cNvSpPr/>
-          <p:nvPr/>
-        </p:nvSpPr>
-        <p:spPr>
-          <a:xfrm>
-            <a:off x="5334000" y="4724399"/>
-            <a:ext cx="3048000" cy="1401763"/>
-          </a:xfrm>
-          <a:prstGeom prst="rect">
-            <a:avLst/>
-          </a:prstGeom>
-          <a:solidFill>
-            <a:srgbClr val="FFFF00"/>
-          </a:solidFill>
-          <a:ln/>
-        </p:spPr>
-        <p:style>
-          <a:lnRef idx="2">
-            <a:schemeClr val="accent1"/>
-          </a:lnRef>
-          <a:fillRef idx="1">
-            <a:schemeClr val="lt1"/>
-          </a:fillRef>
-          <a:effectRef idx="0">
-            <a:schemeClr val="accent1"/>
-          </a:effectRef>
-          <a:fontRef idx="minor">
-            <a:schemeClr val="dk1"/>
-          </a:fontRef>
-        </p:style>
-        <p:txBody>
-          <a:bodyPr rot="0" spcFirstLastPara="0" vertOverflow="overflow" horzOverflow="overflow" vert="horz" wrap="square" lIns="91440" tIns="45720" rIns="91440" bIns="45720" numCol="1" spcCol="0" rtlCol="0" fromWordArt="0" anchor="ctr" anchorCtr="0" forceAA="0" compatLnSpc="1">
-            <a:prstTxWarp prst="textNoShape">
-              <a:avLst/>
-            </a:prstTxWarp>
-            <a:noAutofit/>
-          </a:bodyPr>
-          <a:lstStyle/>
-          <a:p>
-            <a:pPr algn="ctr"/>
-            <a:r>
-              <a:rPr lang="en-US" dirty="0">
-                <a:solidFill>
-                  <a:schemeClr val="tx1"/>
-                </a:solidFill>
-              </a:rPr>
-              <a:t>Guided Practices (to be written): recur on the other argument; </a:t>
-            </a:r>
-            <a:r>
-              <a:rPr lang="en-US" dirty="0" err="1">
-                <a:solidFill>
-                  <a:schemeClr val="tx1"/>
-                </a:solidFill>
-              </a:rPr>
-              <a:t>expt</a:t>
-            </a:r>
-            <a:r>
-              <a:rPr lang="en-US" dirty="0">
-                <a:solidFill>
-                  <a:schemeClr val="tx1"/>
-                </a:solidFill>
-              </a:rPr>
-              <a:t>;</a:t>
-            </a:r>
-          </a:p>
-          <a:p>
-            <a:pPr algn="ctr"/>
-            <a:r>
-              <a:rPr lang="en-US" dirty="0">
-                <a:solidFill>
-                  <a:schemeClr val="tx1"/>
-                </a:solidFill>
-              </a:rPr>
-              <a:t>left-nested lists </a:t>
-            </a:r>
           </a:p>
         </p:txBody>
       </p:sp>

</xml_diff>